<commit_message>
Make zero indexing in diagram
</commit_message>
<xml_diff>
--- a/docs/Geometry Drawings.pptx
+++ b/docs/Geometry Drawings.pptx
@@ -197,7 +197,7 @@
           <a:p>
             <a:fld id="{9FB87BA8-06F6-B646-996A-F4F317E0851D}" type="datetimeFigureOut">
               <a:rPr lang="en-US" smtClean="0"/>
-              <a:t>5/4/21</a:t>
+              <a:t>5/9/21</a:t>
             </a:fld>
             <a:endParaRPr lang="en-US"/>
           </a:p>
@@ -677,7 +677,7 @@
           <a:p>
             <a:fld id="{63EB71E2-6404-9340-A202-DF9F8907A413}" type="datetimeFigureOut">
               <a:rPr lang="en-US" smtClean="0"/>
-              <a:t>5/4/21</a:t>
+              <a:t>5/9/21</a:t>
             </a:fld>
             <a:endParaRPr lang="en-US"/>
           </a:p>
@@ -845,7 +845,7 @@
           <a:p>
             <a:fld id="{63EB71E2-6404-9340-A202-DF9F8907A413}" type="datetimeFigureOut">
               <a:rPr lang="en-US" smtClean="0"/>
-              <a:t>5/4/21</a:t>
+              <a:t>5/9/21</a:t>
             </a:fld>
             <a:endParaRPr lang="en-US"/>
           </a:p>
@@ -1023,7 +1023,7 @@
           <a:p>
             <a:fld id="{63EB71E2-6404-9340-A202-DF9F8907A413}" type="datetimeFigureOut">
               <a:rPr lang="en-US" smtClean="0"/>
-              <a:t>5/4/21</a:t>
+              <a:t>5/9/21</a:t>
             </a:fld>
             <a:endParaRPr lang="en-US"/>
           </a:p>
@@ -1191,7 +1191,7 @@
           <a:p>
             <a:fld id="{63EB71E2-6404-9340-A202-DF9F8907A413}" type="datetimeFigureOut">
               <a:rPr lang="en-US" smtClean="0"/>
-              <a:t>5/4/21</a:t>
+              <a:t>5/9/21</a:t>
             </a:fld>
             <a:endParaRPr lang="en-US"/>
           </a:p>
@@ -1436,7 +1436,7 @@
           <a:p>
             <a:fld id="{63EB71E2-6404-9340-A202-DF9F8907A413}" type="datetimeFigureOut">
               <a:rPr lang="en-US" smtClean="0"/>
-              <a:t>5/4/21</a:t>
+              <a:t>5/9/21</a:t>
             </a:fld>
             <a:endParaRPr lang="en-US"/>
           </a:p>
@@ -1665,7 +1665,7 @@
           <a:p>
             <a:fld id="{63EB71E2-6404-9340-A202-DF9F8907A413}" type="datetimeFigureOut">
               <a:rPr lang="en-US" smtClean="0"/>
-              <a:t>5/4/21</a:t>
+              <a:t>5/9/21</a:t>
             </a:fld>
             <a:endParaRPr lang="en-US"/>
           </a:p>
@@ -2029,7 +2029,7 @@
           <a:p>
             <a:fld id="{63EB71E2-6404-9340-A202-DF9F8907A413}" type="datetimeFigureOut">
               <a:rPr lang="en-US" smtClean="0"/>
-              <a:t>5/4/21</a:t>
+              <a:t>5/9/21</a:t>
             </a:fld>
             <a:endParaRPr lang="en-US"/>
           </a:p>
@@ -2146,7 +2146,7 @@
           <a:p>
             <a:fld id="{63EB71E2-6404-9340-A202-DF9F8907A413}" type="datetimeFigureOut">
               <a:rPr lang="en-US" smtClean="0"/>
-              <a:t>5/4/21</a:t>
+              <a:t>5/9/21</a:t>
             </a:fld>
             <a:endParaRPr lang="en-US"/>
           </a:p>
@@ -2241,7 +2241,7 @@
           <a:p>
             <a:fld id="{63EB71E2-6404-9340-A202-DF9F8907A413}" type="datetimeFigureOut">
               <a:rPr lang="en-US" smtClean="0"/>
-              <a:t>5/4/21</a:t>
+              <a:t>5/9/21</a:t>
             </a:fld>
             <a:endParaRPr lang="en-US"/>
           </a:p>
@@ -2516,7 +2516,7 @@
           <a:p>
             <a:fld id="{63EB71E2-6404-9340-A202-DF9F8907A413}" type="datetimeFigureOut">
               <a:rPr lang="en-US" smtClean="0"/>
-              <a:t>5/4/21</a:t>
+              <a:t>5/9/21</a:t>
             </a:fld>
             <a:endParaRPr lang="en-US"/>
           </a:p>
@@ -2768,7 +2768,7 @@
           <a:p>
             <a:fld id="{63EB71E2-6404-9340-A202-DF9F8907A413}" type="datetimeFigureOut">
               <a:rPr lang="en-US" smtClean="0"/>
-              <a:t>5/4/21</a:t>
+              <a:t>5/9/21</a:t>
             </a:fld>
             <a:endParaRPr lang="en-US"/>
           </a:p>
@@ -2979,7 +2979,7 @@
           <a:p>
             <a:fld id="{63EB71E2-6404-9340-A202-DF9F8907A413}" type="datetimeFigureOut">
               <a:rPr lang="en-US" smtClean="0"/>
-              <a:t>5/4/21</a:t>
+              <a:t>5/9/21</a:t>
             </a:fld>
             <a:endParaRPr lang="en-US"/>
           </a:p>
@@ -9536,8 +9536,8 @@
           </p:style>
         </p:cxnSp>
       </p:grpSp>
-      <mc:AlternateContent xmlns:mc="http://schemas.openxmlformats.org/markup-compatibility/2006">
-        <mc:Choice xmlns:a14="http://schemas.microsoft.com/office/drawing/2010/main" Requires="a14">
+      <mc:AlternateContent xmlns:mc="http://schemas.openxmlformats.org/markup-compatibility/2006" xmlns:a14="http://schemas.microsoft.com/office/drawing/2010/main">
+        <mc:Choice Requires="a14">
           <p:sp>
             <p:nvSpPr>
               <p:cNvPr id="280" name="TextBox 279"/>
@@ -9732,7 +9732,7 @@
             </p:txBody>
           </p:sp>
         </mc:Choice>
-        <mc:Fallback>
+        <mc:Fallback xmlns="">
           <p:sp>
             <p:nvSpPr>
               <p:cNvPr id="280" name="TextBox 279"/>
@@ -10485,7 +10485,7 @@
             </a:r>
             <a:r>
               <a:rPr lang="en-US" sz="1100" dirty="0"/>
-              <a:t>(1)</a:t>
+              <a:t>(0)</a:t>
             </a:r>
           </a:p>
         </p:txBody>
@@ -10523,9 +10523,10 @@
               <a:t>center_offset</a:t>
             </a:r>
             <a:r>
-              <a:rPr lang="en-US" sz="1100" dirty="0"/>
-              <a:t>(2)</a:t>
+              <a:rPr lang="en-US" sz="1100"/>
+              <a:t>(1)</a:t>
             </a:r>
+            <a:endParaRPr lang="en-US" sz="1100" dirty="0"/>
           </a:p>
         </p:txBody>
       </p:sp>

</xml_diff>